<commit_message>
remove db.tf,remove key output, minor edit diagram
</commit_message>
<xml_diff>
--- a/src/Lab-VPC-Diagram.pptx
+++ b/src/Lab-VPC-Diagram.pptx
@@ -259,7 +259,7 @@
           <a:p>
             <a:fld id="{932B8392-2BA9-4B4B-B0D0-1AF9B8531123}" type="datetimeFigureOut">
               <a:rPr lang="en-US" smtClean="0"/>
-              <a:t>12/9/2020</a:t>
+              <a:t>12/11/2020</a:t>
             </a:fld>
             <a:endParaRPr lang="en-US"/>
           </a:p>
@@ -457,7 +457,7 @@
           <a:p>
             <a:fld id="{932B8392-2BA9-4B4B-B0D0-1AF9B8531123}" type="datetimeFigureOut">
               <a:rPr lang="en-US" smtClean="0"/>
-              <a:t>12/9/2020</a:t>
+              <a:t>12/11/2020</a:t>
             </a:fld>
             <a:endParaRPr lang="en-US"/>
           </a:p>
@@ -665,7 +665,7 @@
           <a:p>
             <a:fld id="{932B8392-2BA9-4B4B-B0D0-1AF9B8531123}" type="datetimeFigureOut">
               <a:rPr lang="en-US" smtClean="0"/>
-              <a:t>12/9/2020</a:t>
+              <a:t>12/11/2020</a:t>
             </a:fld>
             <a:endParaRPr lang="en-US"/>
           </a:p>
@@ -863,7 +863,7 @@
           <a:p>
             <a:fld id="{932B8392-2BA9-4B4B-B0D0-1AF9B8531123}" type="datetimeFigureOut">
               <a:rPr lang="en-US" smtClean="0"/>
-              <a:t>12/9/2020</a:t>
+              <a:t>12/11/2020</a:t>
             </a:fld>
             <a:endParaRPr lang="en-US"/>
           </a:p>
@@ -1138,7 +1138,7 @@
           <a:p>
             <a:fld id="{932B8392-2BA9-4B4B-B0D0-1AF9B8531123}" type="datetimeFigureOut">
               <a:rPr lang="en-US" smtClean="0"/>
-              <a:t>12/9/2020</a:t>
+              <a:t>12/11/2020</a:t>
             </a:fld>
             <a:endParaRPr lang="en-US"/>
           </a:p>
@@ -1403,7 +1403,7 @@
           <a:p>
             <a:fld id="{932B8392-2BA9-4B4B-B0D0-1AF9B8531123}" type="datetimeFigureOut">
               <a:rPr lang="en-US" smtClean="0"/>
-              <a:t>12/9/2020</a:t>
+              <a:t>12/11/2020</a:t>
             </a:fld>
             <a:endParaRPr lang="en-US"/>
           </a:p>
@@ -1815,7 +1815,7 @@
           <a:p>
             <a:fld id="{932B8392-2BA9-4B4B-B0D0-1AF9B8531123}" type="datetimeFigureOut">
               <a:rPr lang="en-US" smtClean="0"/>
-              <a:t>12/9/2020</a:t>
+              <a:t>12/11/2020</a:t>
             </a:fld>
             <a:endParaRPr lang="en-US"/>
           </a:p>
@@ -1956,7 +1956,7 @@
           <a:p>
             <a:fld id="{932B8392-2BA9-4B4B-B0D0-1AF9B8531123}" type="datetimeFigureOut">
               <a:rPr lang="en-US" smtClean="0"/>
-              <a:t>12/9/2020</a:t>
+              <a:t>12/11/2020</a:t>
             </a:fld>
             <a:endParaRPr lang="en-US"/>
           </a:p>
@@ -2069,7 +2069,7 @@
           <a:p>
             <a:fld id="{932B8392-2BA9-4B4B-B0D0-1AF9B8531123}" type="datetimeFigureOut">
               <a:rPr lang="en-US" smtClean="0"/>
-              <a:t>12/9/2020</a:t>
+              <a:t>12/11/2020</a:t>
             </a:fld>
             <a:endParaRPr lang="en-US"/>
           </a:p>
@@ -2380,7 +2380,7 @@
           <a:p>
             <a:fld id="{932B8392-2BA9-4B4B-B0D0-1AF9B8531123}" type="datetimeFigureOut">
               <a:rPr lang="en-US" smtClean="0"/>
-              <a:t>12/9/2020</a:t>
+              <a:t>12/11/2020</a:t>
             </a:fld>
             <a:endParaRPr lang="en-US"/>
           </a:p>
@@ -2668,7 +2668,7 @@
           <a:p>
             <a:fld id="{932B8392-2BA9-4B4B-B0D0-1AF9B8531123}" type="datetimeFigureOut">
               <a:rPr lang="en-US" smtClean="0"/>
-              <a:t>12/9/2020</a:t>
+              <a:t>12/11/2020</a:t>
             </a:fld>
             <a:endParaRPr lang="en-US"/>
           </a:p>
@@ -2909,7 +2909,7 @@
           <a:p>
             <a:fld id="{932B8392-2BA9-4B4B-B0D0-1AF9B8531123}" type="datetimeFigureOut">
               <a:rPr lang="en-US" smtClean="0"/>
-              <a:t>12/9/2020</a:t>
+              <a:t>12/11/2020</a:t>
             </a:fld>
             <a:endParaRPr lang="en-US"/>
           </a:p>
@@ -3582,7 +3582,7 @@
                 <a:latin typeface="Gotham Medium" panose="02000604030000020004" pitchFamily="50" charset="0"/>
                 <a:ea typeface="Roboto Medium" panose="02000000000000000000" pitchFamily="2" charset="0"/>
               </a:rPr>
-              <a:t>web-server-a</a:t>
+              <a:t>web-server-A</a:t>
             </a:r>
           </a:p>
         </p:txBody>
@@ -3983,7 +3983,7 @@
                 <a:latin typeface="Gotham Medium" panose="02000604030000020004" pitchFamily="50" charset="0"/>
                 <a:ea typeface="Roboto Medium" panose="02000000000000000000" pitchFamily="2" charset="0"/>
               </a:rPr>
-              <a:t>web-server-b</a:t>
+              <a:t>web-server-B</a:t>
             </a:r>
           </a:p>
         </p:txBody>

</xml_diff>